<commit_message>
Slides at about 50 percent complete, copy number boxplots are working
</commit_message>
<xml_diff>
--- a/genexdemo_slides.pptx
+++ b/genexdemo_slides.pptx
@@ -5,16 +5,25 @@
     <p:sldMasterId id="2147483648" r:id="rId1"/>
   </p:sldMasterIdLst>
   <p:notesMasterIdLst>
-    <p:notesMasterId r:id="rId6"/>
+    <p:notesMasterId r:id="rId15"/>
   </p:notesMasterIdLst>
   <p:handoutMasterIdLst>
-    <p:handoutMasterId r:id="rId7"/>
+    <p:handoutMasterId r:id="rId16"/>
   </p:handoutMasterIdLst>
   <p:sldIdLst>
     <p:sldId id="369" r:id="rId2"/>
     <p:sldId id="326" r:id="rId3"/>
     <p:sldId id="331" r:id="rId4"/>
     <p:sldId id="364" r:id="rId5"/>
+    <p:sldId id="370" r:id="rId6"/>
+    <p:sldId id="371" r:id="rId7"/>
+    <p:sldId id="372" r:id="rId8"/>
+    <p:sldId id="378" r:id="rId9"/>
+    <p:sldId id="379" r:id="rId10"/>
+    <p:sldId id="374" r:id="rId11"/>
+    <p:sldId id="375" r:id="rId12"/>
+    <p:sldId id="376" r:id="rId13"/>
+    <p:sldId id="377" r:id="rId14"/>
   </p:sldIdLst>
   <p:sldSz cx="9144000" cy="6858000" type="screen4x3"/>
   <p:notesSz cx="6858000" cy="9144000"/>
@@ -199,7 +208,7 @@
             <a:fld id="{5A130199-4B0F-F34D-8B2F-8DC7A2BA724B}" type="datetimeFigureOut">
               <a:rPr lang="en-US" smtClean="0"/>
               <a:pPr/>
-              <a:t>5/20/15</a:t>
+              <a:t>5/21/15</a:t>
             </a:fld>
             <a:endParaRPr lang="en-GB"/>
           </a:p>
@@ -362,7 +371,7 @@
             <a:fld id="{FF5F0B3E-B3CA-6B43-A39F-7DF9FB3B3633}" type="datetimeFigureOut">
               <a:rPr lang="en-US" smtClean="0"/>
               <a:pPr/>
-              <a:t>5/20/15</a:t>
+              <a:t>5/21/15</a:t>
             </a:fld>
             <a:endParaRPr lang="en-GB"/>
           </a:p>
@@ -6451,12 +6460,12 @@
               <a:t>R </a:t>
             </a:r>
             <a:r>
-              <a:rPr lang="en-US" dirty="0" err="1" smtClean="0"/>
-              <a:t>Anlaysis</a:t>
-            </a:r>
-            <a:r>
               <a:rPr lang="en-US" dirty="0" smtClean="0"/>
-              <a:t> :</a:t>
+              <a:t>Analysis </a:t>
+            </a:r>
+            <a:r>
+              <a:rPr lang="en-US" dirty="0" smtClean="0"/>
+              <a:t>:</a:t>
             </a:r>
             <a:br>
               <a:rPr lang="en-US" dirty="0" smtClean="0"/>
@@ -6499,6 +6508,474 @@
               <a:t>ICR Bioinformatics introduction</a:t>
             </a:r>
             <a:endParaRPr lang="en-GB" dirty="0"/>
+          </a:p>
+        </p:txBody>
+      </p:sp>
+    </p:spTree>
+  </p:cSld>
+  <p:clrMapOvr>
+    <a:masterClrMapping/>
+  </p:clrMapOvr>
+  <p:timing>
+    <p:tnLst>
+      <p:par>
+        <p:cTn id="1" dur="indefinite" restart="never" nodeType="tmRoot"/>
+      </p:par>
+    </p:tnLst>
+  </p:timing>
+</p:sld>
+</file>
+
+<file path=ppt/slides/slide10.xml><?xml version="1.0" encoding="utf-8"?>
+<p:sld xmlns:a="http://schemas.openxmlformats.org/drawingml/2006/main" xmlns:r="http://schemas.openxmlformats.org/officeDocument/2006/relationships" xmlns:mc="http://schemas.openxmlformats.org/markup-compatibility/2006" xmlns:mv="urn:schemas-microsoft-com:mac:vml" xmlns:p="http://schemas.openxmlformats.org/presentationml/2006/main" mc:Ignorable="mv" mc:PreserveAttributes="mv:*">
+  <p:cSld>
+    <p:spTree>
+      <p:nvGrpSpPr>
+        <p:cNvPr id="1" name=""/>
+        <p:cNvGrpSpPr/>
+        <p:nvPr/>
+      </p:nvGrpSpPr>
+      <p:grpSpPr>
+        <a:xfrm>
+          <a:off x="0" y="0"/>
+          <a:ext cx="0" cy="0"/>
+          <a:chOff x="0" y="0"/>
+          <a:chExt cx="0" cy="0"/>
+        </a:xfrm>
+      </p:grpSpPr>
+      <p:sp>
+        <p:nvSpPr>
+          <p:cNvPr id="2" name="Text Placeholder 1"/>
+          <p:cNvSpPr>
+            <a:spLocks noGrp="1"/>
+          </p:cNvSpPr>
+          <p:nvPr>
+            <p:ph type="body" sz="quarter" idx="13"/>
+          </p:nvPr>
+        </p:nvSpPr>
+        <p:spPr/>
+        <p:txBody>
+          <a:bodyPr/>
+          <a:lstStyle/>
+          <a:p>
+            <a:r>
+              <a:rPr lang="en-US" dirty="0" err="1" smtClean="0"/>
+              <a:t>asd</a:t>
+            </a:r>
+            <a:endParaRPr lang="en-US" dirty="0" smtClean="0"/>
+          </a:p>
+          <a:p>
+            <a:pPr lvl="1"/>
+            <a:r>
+              <a:rPr lang="en-US" dirty="0" err="1" smtClean="0"/>
+              <a:t>asd</a:t>
+            </a:r>
+            <a:endParaRPr lang="en-US" dirty="0" smtClean="0"/>
+          </a:p>
+        </p:txBody>
+      </p:sp>
+      <p:sp>
+        <p:nvSpPr>
+          <p:cNvPr id="5" name="Content Placeholder 4"/>
+          <p:cNvSpPr>
+            <a:spLocks noGrp="1"/>
+          </p:cNvSpPr>
+          <p:nvPr>
+            <p:ph idx="1"/>
+          </p:nvPr>
+        </p:nvSpPr>
+        <p:spPr/>
+        <p:txBody>
+          <a:bodyPr>
+            <a:noAutofit/>
+          </a:bodyPr>
+          <a:lstStyle/>
+          <a:p>
+            <a:pPr lvl="1">
+              <a:spcAft>
+                <a:spcPts val="1800"/>
+              </a:spcAft>
+            </a:pPr>
+            <a:r>
+              <a:rPr lang="en-US" sz="2800" dirty="0" err="1" smtClean="0"/>
+              <a:t>asd</a:t>
+            </a:r>
+            <a:endParaRPr lang="en-US" sz="2800" dirty="0" smtClean="0"/>
+          </a:p>
+        </p:txBody>
+      </p:sp>
+      <p:sp>
+        <p:nvSpPr>
+          <p:cNvPr id="4" name="Slide Number Placeholder 3"/>
+          <p:cNvSpPr>
+            <a:spLocks noGrp="1"/>
+          </p:cNvSpPr>
+          <p:nvPr>
+            <p:ph type="sldNum" sz="quarter" idx="12"/>
+          </p:nvPr>
+        </p:nvSpPr>
+        <p:spPr/>
+        <p:txBody>
+          <a:bodyPr/>
+          <a:lstStyle/>
+          <a:p>
+            <a:fld id="{B9B2A88A-9ECB-DF45-A377-2575079D0564}" type="slidenum">
+              <a:rPr lang="en-GB" smtClean="0"/>
+              <a:pPr/>
+              <a:t>10</a:t>
+            </a:fld>
+            <a:endParaRPr lang="en-GB"/>
+          </a:p>
+        </p:txBody>
+      </p:sp>
+    </p:spTree>
+  </p:cSld>
+  <p:clrMapOvr>
+    <a:masterClrMapping/>
+  </p:clrMapOvr>
+  <p:timing>
+    <p:tnLst>
+      <p:par>
+        <p:cTn id="1" dur="indefinite" restart="never" nodeType="tmRoot"/>
+      </p:par>
+    </p:tnLst>
+  </p:timing>
+</p:sld>
+</file>
+
+<file path=ppt/slides/slide11.xml><?xml version="1.0" encoding="utf-8"?>
+<p:sld xmlns:a="http://schemas.openxmlformats.org/drawingml/2006/main" xmlns:r="http://schemas.openxmlformats.org/officeDocument/2006/relationships" xmlns:mc="http://schemas.openxmlformats.org/markup-compatibility/2006" xmlns:mv="urn:schemas-microsoft-com:mac:vml" xmlns:p="http://schemas.openxmlformats.org/presentationml/2006/main" mc:Ignorable="mv" mc:PreserveAttributes="mv:*">
+  <p:cSld>
+    <p:spTree>
+      <p:nvGrpSpPr>
+        <p:cNvPr id="1" name=""/>
+        <p:cNvGrpSpPr/>
+        <p:nvPr/>
+      </p:nvGrpSpPr>
+      <p:grpSpPr>
+        <a:xfrm>
+          <a:off x="0" y="0"/>
+          <a:ext cx="0" cy="0"/>
+          <a:chOff x="0" y="0"/>
+          <a:chExt cx="0" cy="0"/>
+        </a:xfrm>
+      </p:grpSpPr>
+      <p:sp>
+        <p:nvSpPr>
+          <p:cNvPr id="2" name="Text Placeholder 1"/>
+          <p:cNvSpPr>
+            <a:spLocks noGrp="1"/>
+          </p:cNvSpPr>
+          <p:nvPr>
+            <p:ph type="body" sz="quarter" idx="13"/>
+          </p:nvPr>
+        </p:nvSpPr>
+        <p:spPr/>
+        <p:txBody>
+          <a:bodyPr/>
+          <a:lstStyle/>
+          <a:p>
+            <a:r>
+              <a:rPr lang="en-US" dirty="0" err="1" smtClean="0"/>
+              <a:t>asd</a:t>
+            </a:r>
+            <a:endParaRPr lang="en-US" dirty="0" smtClean="0"/>
+          </a:p>
+          <a:p>
+            <a:pPr lvl="1"/>
+            <a:r>
+              <a:rPr lang="en-US" dirty="0" err="1" smtClean="0"/>
+              <a:t>asd</a:t>
+            </a:r>
+            <a:endParaRPr lang="en-US" dirty="0" smtClean="0"/>
+          </a:p>
+        </p:txBody>
+      </p:sp>
+      <p:sp>
+        <p:nvSpPr>
+          <p:cNvPr id="5" name="Content Placeholder 4"/>
+          <p:cNvSpPr>
+            <a:spLocks noGrp="1"/>
+          </p:cNvSpPr>
+          <p:nvPr>
+            <p:ph idx="1"/>
+          </p:nvPr>
+        </p:nvSpPr>
+        <p:spPr/>
+        <p:txBody>
+          <a:bodyPr>
+            <a:noAutofit/>
+          </a:bodyPr>
+          <a:lstStyle/>
+          <a:p>
+            <a:pPr lvl="1">
+              <a:spcAft>
+                <a:spcPts val="1800"/>
+              </a:spcAft>
+            </a:pPr>
+            <a:r>
+              <a:rPr lang="en-US" sz="2800" dirty="0" err="1" smtClean="0"/>
+              <a:t>asd</a:t>
+            </a:r>
+            <a:endParaRPr lang="en-US" sz="2800" dirty="0" smtClean="0"/>
+          </a:p>
+        </p:txBody>
+      </p:sp>
+      <p:sp>
+        <p:nvSpPr>
+          <p:cNvPr id="4" name="Slide Number Placeholder 3"/>
+          <p:cNvSpPr>
+            <a:spLocks noGrp="1"/>
+          </p:cNvSpPr>
+          <p:nvPr>
+            <p:ph type="sldNum" sz="quarter" idx="12"/>
+          </p:nvPr>
+        </p:nvSpPr>
+        <p:spPr/>
+        <p:txBody>
+          <a:bodyPr/>
+          <a:lstStyle/>
+          <a:p>
+            <a:fld id="{B9B2A88A-9ECB-DF45-A377-2575079D0564}" type="slidenum">
+              <a:rPr lang="en-GB" smtClean="0"/>
+              <a:pPr/>
+              <a:t>11</a:t>
+            </a:fld>
+            <a:endParaRPr lang="en-GB"/>
+          </a:p>
+        </p:txBody>
+      </p:sp>
+    </p:spTree>
+  </p:cSld>
+  <p:clrMapOvr>
+    <a:masterClrMapping/>
+  </p:clrMapOvr>
+  <p:timing>
+    <p:tnLst>
+      <p:par>
+        <p:cTn id="1" dur="indefinite" restart="never" nodeType="tmRoot"/>
+      </p:par>
+    </p:tnLst>
+  </p:timing>
+</p:sld>
+</file>
+
+<file path=ppt/slides/slide12.xml><?xml version="1.0" encoding="utf-8"?>
+<p:sld xmlns:a="http://schemas.openxmlformats.org/drawingml/2006/main" xmlns:r="http://schemas.openxmlformats.org/officeDocument/2006/relationships" xmlns:mc="http://schemas.openxmlformats.org/markup-compatibility/2006" xmlns:mv="urn:schemas-microsoft-com:mac:vml" xmlns:p="http://schemas.openxmlformats.org/presentationml/2006/main" mc:Ignorable="mv" mc:PreserveAttributes="mv:*">
+  <p:cSld>
+    <p:spTree>
+      <p:nvGrpSpPr>
+        <p:cNvPr id="1" name=""/>
+        <p:cNvGrpSpPr/>
+        <p:nvPr/>
+      </p:nvGrpSpPr>
+      <p:grpSpPr>
+        <a:xfrm>
+          <a:off x="0" y="0"/>
+          <a:ext cx="0" cy="0"/>
+          <a:chOff x="0" y="0"/>
+          <a:chExt cx="0" cy="0"/>
+        </a:xfrm>
+      </p:grpSpPr>
+      <p:sp>
+        <p:nvSpPr>
+          <p:cNvPr id="2" name="Text Placeholder 1"/>
+          <p:cNvSpPr>
+            <a:spLocks noGrp="1"/>
+          </p:cNvSpPr>
+          <p:nvPr>
+            <p:ph type="body" sz="quarter" idx="13"/>
+          </p:nvPr>
+        </p:nvSpPr>
+        <p:spPr/>
+        <p:txBody>
+          <a:bodyPr/>
+          <a:lstStyle/>
+          <a:p>
+            <a:r>
+              <a:rPr lang="en-US" dirty="0" err="1" smtClean="0"/>
+              <a:t>asd</a:t>
+            </a:r>
+            <a:endParaRPr lang="en-US" dirty="0" smtClean="0"/>
+          </a:p>
+          <a:p>
+            <a:pPr lvl="1"/>
+            <a:r>
+              <a:rPr lang="en-US" dirty="0" err="1" smtClean="0"/>
+              <a:t>asd</a:t>
+            </a:r>
+            <a:endParaRPr lang="en-US" dirty="0" smtClean="0"/>
+          </a:p>
+        </p:txBody>
+      </p:sp>
+      <p:sp>
+        <p:nvSpPr>
+          <p:cNvPr id="5" name="Content Placeholder 4"/>
+          <p:cNvSpPr>
+            <a:spLocks noGrp="1"/>
+          </p:cNvSpPr>
+          <p:nvPr>
+            <p:ph idx="1"/>
+          </p:nvPr>
+        </p:nvSpPr>
+        <p:spPr/>
+        <p:txBody>
+          <a:bodyPr>
+            <a:noAutofit/>
+          </a:bodyPr>
+          <a:lstStyle/>
+          <a:p>
+            <a:pPr lvl="1">
+              <a:spcAft>
+                <a:spcPts val="1800"/>
+              </a:spcAft>
+            </a:pPr>
+            <a:r>
+              <a:rPr lang="en-US" sz="2800" dirty="0" err="1" smtClean="0"/>
+              <a:t>asd</a:t>
+            </a:r>
+            <a:endParaRPr lang="en-US" sz="2800" dirty="0" smtClean="0"/>
+          </a:p>
+        </p:txBody>
+      </p:sp>
+      <p:sp>
+        <p:nvSpPr>
+          <p:cNvPr id="4" name="Slide Number Placeholder 3"/>
+          <p:cNvSpPr>
+            <a:spLocks noGrp="1"/>
+          </p:cNvSpPr>
+          <p:nvPr>
+            <p:ph type="sldNum" sz="quarter" idx="12"/>
+          </p:nvPr>
+        </p:nvSpPr>
+        <p:spPr/>
+        <p:txBody>
+          <a:bodyPr/>
+          <a:lstStyle/>
+          <a:p>
+            <a:fld id="{B9B2A88A-9ECB-DF45-A377-2575079D0564}" type="slidenum">
+              <a:rPr lang="en-GB" smtClean="0"/>
+              <a:pPr/>
+              <a:t>12</a:t>
+            </a:fld>
+            <a:endParaRPr lang="en-GB"/>
+          </a:p>
+        </p:txBody>
+      </p:sp>
+    </p:spTree>
+  </p:cSld>
+  <p:clrMapOvr>
+    <a:masterClrMapping/>
+  </p:clrMapOvr>
+  <p:timing>
+    <p:tnLst>
+      <p:par>
+        <p:cTn id="1" dur="indefinite" restart="never" nodeType="tmRoot"/>
+      </p:par>
+    </p:tnLst>
+  </p:timing>
+</p:sld>
+</file>
+
+<file path=ppt/slides/slide13.xml><?xml version="1.0" encoding="utf-8"?>
+<p:sld xmlns:a="http://schemas.openxmlformats.org/drawingml/2006/main" xmlns:r="http://schemas.openxmlformats.org/officeDocument/2006/relationships" xmlns:mc="http://schemas.openxmlformats.org/markup-compatibility/2006" xmlns:mv="urn:schemas-microsoft-com:mac:vml" xmlns:p="http://schemas.openxmlformats.org/presentationml/2006/main" mc:Ignorable="mv" mc:PreserveAttributes="mv:*">
+  <p:cSld>
+    <p:spTree>
+      <p:nvGrpSpPr>
+        <p:cNvPr id="1" name=""/>
+        <p:cNvGrpSpPr/>
+        <p:nvPr/>
+      </p:nvGrpSpPr>
+      <p:grpSpPr>
+        <a:xfrm>
+          <a:off x="0" y="0"/>
+          <a:ext cx="0" cy="0"/>
+          <a:chOff x="0" y="0"/>
+          <a:chExt cx="0" cy="0"/>
+        </a:xfrm>
+      </p:grpSpPr>
+      <p:sp>
+        <p:nvSpPr>
+          <p:cNvPr id="2" name="Text Placeholder 1"/>
+          <p:cNvSpPr>
+            <a:spLocks noGrp="1"/>
+          </p:cNvSpPr>
+          <p:nvPr>
+            <p:ph type="body" sz="quarter" idx="13"/>
+          </p:nvPr>
+        </p:nvSpPr>
+        <p:spPr/>
+        <p:txBody>
+          <a:bodyPr/>
+          <a:lstStyle/>
+          <a:p>
+            <a:r>
+              <a:rPr lang="en-US" dirty="0" err="1" smtClean="0"/>
+              <a:t>asd</a:t>
+            </a:r>
+            <a:endParaRPr lang="en-US" dirty="0" smtClean="0"/>
+          </a:p>
+          <a:p>
+            <a:pPr lvl="1"/>
+            <a:r>
+              <a:rPr lang="en-US" dirty="0" err="1" smtClean="0"/>
+              <a:t>asd</a:t>
+            </a:r>
+            <a:endParaRPr lang="en-US" dirty="0" smtClean="0"/>
+          </a:p>
+        </p:txBody>
+      </p:sp>
+      <p:sp>
+        <p:nvSpPr>
+          <p:cNvPr id="5" name="Content Placeholder 4"/>
+          <p:cNvSpPr>
+            <a:spLocks noGrp="1"/>
+          </p:cNvSpPr>
+          <p:nvPr>
+            <p:ph idx="1"/>
+          </p:nvPr>
+        </p:nvSpPr>
+        <p:spPr/>
+        <p:txBody>
+          <a:bodyPr>
+            <a:noAutofit/>
+          </a:bodyPr>
+          <a:lstStyle/>
+          <a:p>
+            <a:pPr lvl="1">
+              <a:spcAft>
+                <a:spcPts val="1800"/>
+              </a:spcAft>
+            </a:pPr>
+            <a:r>
+              <a:rPr lang="en-US" sz="2800" dirty="0" err="1" smtClean="0"/>
+              <a:t>asd</a:t>
+            </a:r>
+            <a:endParaRPr lang="en-US" sz="2800" dirty="0" smtClean="0"/>
+          </a:p>
+        </p:txBody>
+      </p:sp>
+      <p:sp>
+        <p:nvSpPr>
+          <p:cNvPr id="4" name="Slide Number Placeholder 3"/>
+          <p:cNvSpPr>
+            <a:spLocks noGrp="1"/>
+          </p:cNvSpPr>
+          <p:nvPr>
+            <p:ph type="sldNum" sz="quarter" idx="12"/>
+          </p:nvPr>
+        </p:nvSpPr>
+        <p:spPr/>
+        <p:txBody>
+          <a:bodyPr/>
+          <a:lstStyle/>
+          <a:p>
+            <a:fld id="{B9B2A88A-9ECB-DF45-A377-2575079D0564}" type="slidenum">
+              <a:rPr lang="en-GB" smtClean="0"/>
+              <a:pPr/>
+              <a:t>13</a:t>
+            </a:fld>
+            <a:endParaRPr lang="en-GB"/>
           </a:p>
         </p:txBody>
       </p:sp>
@@ -6778,15 +7255,23 @@
             </a:pPr>
             <a:r>
               <a:rPr lang="en-US" sz="2800" dirty="0" smtClean="0"/>
-              <a:t>Look for </a:t>
+              <a:t>Look for</a:t>
+            </a:r>
+            <a:r>
+              <a:rPr lang="en-US" sz="2800" dirty="0" smtClean="0"/>
+              <a:t> </a:t>
             </a:r>
             <a:r>
               <a:rPr lang="en-US" sz="2800" dirty="0" err="1" smtClean="0"/>
-              <a:t>icr_bic_gdsc</a:t>
+              <a:t>genexdrugdemo</a:t>
             </a:r>
             <a:r>
               <a:rPr lang="en-US" sz="2800" dirty="0" smtClean="0"/>
-              <a:t> project</a:t>
+              <a:t> </a:t>
+            </a:r>
+            <a:r>
+              <a:rPr lang="en-US" sz="2800" dirty="0" smtClean="0"/>
+              <a:t>project</a:t>
             </a:r>
           </a:p>
           <a:p>
@@ -6797,11 +7282,112 @@
             </a:pPr>
             <a:r>
               <a:rPr lang="en-US" sz="2800" dirty="0" smtClean="0"/>
-              <a:t>Download all files to a </a:t>
-            </a:r>
-            <a:r>
-              <a:rPr lang="en-US" sz="2800" smtClean="0"/>
-              <a:t>local directory</a:t>
+              <a:t>Download all files to a local </a:t>
+            </a:r>
+            <a:r>
+              <a:rPr lang="en-US" sz="2800" dirty="0" smtClean="0"/>
+              <a:t>directory</a:t>
+            </a:r>
+          </a:p>
+          <a:p>
+            <a:pPr lvl="1">
+              <a:spcAft>
+                <a:spcPts val="1800"/>
+              </a:spcAft>
+              <a:buNone/>
+            </a:pPr>
+            <a:r>
+              <a:rPr lang="en-US" sz="2800" dirty="0" smtClean="0">
+                <a:solidFill>
+                  <a:schemeClr val="tx2">
+                    <a:lumMod val="60000"/>
+                    <a:lumOff val="40000"/>
+                  </a:schemeClr>
+                </a:solidFill>
+              </a:rPr>
+              <a:t>		</a:t>
+            </a:r>
+            <a:r>
+              <a:rPr lang="en-US" sz="1600" dirty="0" err="1" smtClean="0">
+                <a:solidFill>
+                  <a:schemeClr val="tx2">
+                    <a:lumMod val="60000"/>
+                    <a:lumOff val="40000"/>
+                  </a:schemeClr>
+                </a:solidFill>
+                <a:latin typeface="Courier"/>
+                <a:cs typeface="Courier"/>
+              </a:rPr>
+              <a:t>git</a:t>
+            </a:r>
+            <a:r>
+              <a:rPr lang="en-US" sz="1600" dirty="0" smtClean="0">
+                <a:solidFill>
+                  <a:schemeClr val="tx2">
+                    <a:lumMod val="60000"/>
+                    <a:lumOff val="40000"/>
+                  </a:schemeClr>
+                </a:solidFill>
+                <a:latin typeface="Courier"/>
+                <a:cs typeface="Courier"/>
+              </a:rPr>
+              <a:t> clone \</a:t>
+            </a:r>
+          </a:p>
+          <a:p>
+            <a:pPr lvl="1">
+              <a:spcAft>
+                <a:spcPts val="1800"/>
+              </a:spcAft>
+              <a:buNone/>
+            </a:pPr>
+            <a:r>
+              <a:rPr lang="en-US" sz="1600" dirty="0" smtClean="0">
+                <a:solidFill>
+                  <a:schemeClr val="tx2">
+                    <a:lumMod val="60000"/>
+                    <a:lumOff val="40000"/>
+                  </a:schemeClr>
+                </a:solidFill>
+                <a:latin typeface="Courier"/>
+                <a:cs typeface="Courier"/>
+              </a:rPr>
+              <a:t>		</a:t>
+            </a:r>
+            <a:r>
+              <a:rPr lang="en-US" sz="1600" dirty="0" smtClean="0">
+                <a:solidFill>
+                  <a:schemeClr val="tx2">
+                    <a:lumMod val="60000"/>
+                    <a:lumOff val="40000"/>
+                  </a:schemeClr>
+                </a:solidFill>
+                <a:latin typeface="Courier"/>
+                <a:cs typeface="Courier"/>
+                <a:hlinkClick r:id="rId3"/>
+              </a:rPr>
+              <a:t>https://github.com/DrJCampbell/genexdrugdemo.git</a:t>
+            </a:r>
+            <a:endParaRPr lang="en-US" sz="1600" dirty="0" smtClean="0">
+              <a:solidFill>
+                <a:schemeClr val="tx2">
+                  <a:lumMod val="60000"/>
+                  <a:lumOff val="40000"/>
+                </a:schemeClr>
+              </a:solidFill>
+              <a:latin typeface="Courier"/>
+              <a:cs typeface="Courier"/>
+            </a:endParaRPr>
+          </a:p>
+          <a:p>
+            <a:pPr lvl="1">
+              <a:spcAft>
+                <a:spcPts val="1800"/>
+              </a:spcAft>
+            </a:pPr>
+            <a:r>
+              <a:rPr lang="en-US" sz="2800" dirty="0" smtClean="0"/>
+              <a:t>Or you can get the zip file</a:t>
             </a:r>
             <a:endParaRPr lang="en-US" sz="2800" dirty="0" smtClean="0"/>
           </a:p>
@@ -6831,6 +7417,30 @@
           </a:p>
         </p:txBody>
       </p:sp>
+      <p:pic>
+        <p:nvPicPr>
+          <p:cNvPr id="6" name="Picture 5"/>
+          <p:cNvPicPr>
+            <a:picLocks noChangeAspect="1"/>
+          </p:cNvPicPr>
+          <p:nvPr/>
+        </p:nvPicPr>
+        <p:blipFill>
+          <a:blip r:embed="rId4"/>
+          <a:stretch>
+            <a:fillRect/>
+          </a:stretch>
+        </p:blipFill>
+        <p:spPr>
+          <a:xfrm>
+            <a:off x="6833880" y="4276748"/>
+            <a:ext cx="2159307" cy="2348720"/>
+          </a:xfrm>
+          <a:prstGeom prst="rect">
+            <a:avLst/>
+          </a:prstGeom>
+        </p:spPr>
+      </p:pic>
     </p:spTree>
   </p:cSld>
   <p:clrMapOvr>
@@ -6879,7 +7489,7 @@
         </p:blipFill>
         <p:spPr>
           <a:xfrm>
-            <a:off x="2154970" y="1723312"/>
+            <a:off x="-77400" y="1736012"/>
             <a:ext cx="6215175" cy="4956888"/>
           </a:xfrm>
           <a:prstGeom prst="rect">
@@ -6902,6 +7512,10 @@
           <a:bodyPr/>
           <a:lstStyle/>
           <a:p>
+            <a:r>
+              <a:rPr lang="en-US" dirty="0" smtClean="0"/>
+              <a:t>The data set</a:t>
+            </a:r>
             <a:endParaRPr lang="en-US" dirty="0" smtClean="0"/>
           </a:p>
         </p:txBody>
@@ -6946,12 +7560,1057 @@
         </p:blipFill>
         <p:spPr>
           <a:xfrm>
-            <a:off x="227400" y="1778000"/>
+            <a:off x="5944842" y="1799512"/>
             <a:ext cx="2067271" cy="4991100"/>
           </a:xfrm>
           <a:prstGeom prst="rect">
             <a:avLst/>
           </a:prstGeom>
+        </p:spPr>
+      </p:pic>
+    </p:spTree>
+  </p:cSld>
+  <p:clrMapOvr>
+    <a:masterClrMapping/>
+  </p:clrMapOvr>
+  <p:timing>
+    <p:tnLst>
+      <p:par>
+        <p:cTn id="1" dur="indefinite" restart="never" nodeType="tmRoot"/>
+      </p:par>
+    </p:tnLst>
+  </p:timing>
+</p:sld>
+</file>
+
+<file path=ppt/slides/slide5.xml><?xml version="1.0" encoding="utf-8"?>
+<p:sld xmlns:a="http://schemas.openxmlformats.org/drawingml/2006/main" xmlns:r="http://schemas.openxmlformats.org/officeDocument/2006/relationships" xmlns:mc="http://schemas.openxmlformats.org/markup-compatibility/2006" xmlns:mv="urn:schemas-microsoft-com:mac:vml" xmlns:p="http://schemas.openxmlformats.org/presentationml/2006/main" mc:Ignorable="mv" mc:PreserveAttributes="mv:*">
+  <p:cSld>
+    <p:spTree>
+      <p:nvGrpSpPr>
+        <p:cNvPr id="1" name=""/>
+        <p:cNvGrpSpPr/>
+        <p:nvPr/>
+      </p:nvGrpSpPr>
+      <p:grpSpPr>
+        <a:xfrm>
+          <a:off x="0" y="0"/>
+          <a:ext cx="0" cy="0"/>
+          <a:chOff x="0" y="0"/>
+          <a:chExt cx="0" cy="0"/>
+        </a:xfrm>
+      </p:grpSpPr>
+      <p:sp>
+        <p:nvSpPr>
+          <p:cNvPr id="2" name="Text Placeholder 1"/>
+          <p:cNvSpPr>
+            <a:spLocks noGrp="1"/>
+          </p:cNvSpPr>
+          <p:nvPr>
+            <p:ph type="body" sz="quarter" idx="13"/>
+          </p:nvPr>
+        </p:nvSpPr>
+        <p:spPr/>
+        <p:txBody>
+          <a:bodyPr/>
+          <a:lstStyle/>
+          <a:p>
+            <a:r>
+              <a:rPr lang="en-US" dirty="0" smtClean="0"/>
+              <a:t>Data overview here</a:t>
+            </a:r>
+          </a:p>
+          <a:p>
+            <a:pPr lvl="1"/>
+            <a:r>
+              <a:rPr lang="en-US" dirty="0" err="1" smtClean="0"/>
+              <a:t>asd</a:t>
+            </a:r>
+            <a:endParaRPr lang="en-US" dirty="0" smtClean="0"/>
+          </a:p>
+        </p:txBody>
+      </p:sp>
+      <p:sp>
+        <p:nvSpPr>
+          <p:cNvPr id="5" name="Content Placeholder 4"/>
+          <p:cNvSpPr>
+            <a:spLocks noGrp="1"/>
+          </p:cNvSpPr>
+          <p:nvPr>
+            <p:ph idx="1"/>
+          </p:nvPr>
+        </p:nvSpPr>
+        <p:spPr/>
+        <p:txBody>
+          <a:bodyPr>
+            <a:noAutofit/>
+          </a:bodyPr>
+          <a:lstStyle/>
+          <a:p>
+            <a:pPr lvl="1">
+              <a:spcAft>
+                <a:spcPts val="1800"/>
+              </a:spcAft>
+            </a:pPr>
+            <a:r>
+              <a:rPr lang="en-US" sz="2800" dirty="0" err="1" smtClean="0"/>
+              <a:t>asd</a:t>
+            </a:r>
+            <a:endParaRPr lang="en-US" sz="2800" dirty="0" smtClean="0"/>
+          </a:p>
+        </p:txBody>
+      </p:sp>
+      <p:sp>
+        <p:nvSpPr>
+          <p:cNvPr id="4" name="Slide Number Placeholder 3"/>
+          <p:cNvSpPr>
+            <a:spLocks noGrp="1"/>
+          </p:cNvSpPr>
+          <p:nvPr>
+            <p:ph type="sldNum" sz="quarter" idx="12"/>
+          </p:nvPr>
+        </p:nvSpPr>
+        <p:spPr/>
+        <p:txBody>
+          <a:bodyPr/>
+          <a:lstStyle/>
+          <a:p>
+            <a:fld id="{B9B2A88A-9ECB-DF45-A377-2575079D0564}" type="slidenum">
+              <a:rPr lang="en-GB" smtClean="0"/>
+              <a:pPr/>
+              <a:t>5</a:t>
+            </a:fld>
+            <a:endParaRPr lang="en-GB"/>
+          </a:p>
+        </p:txBody>
+      </p:sp>
+    </p:spTree>
+  </p:cSld>
+  <p:clrMapOvr>
+    <a:masterClrMapping/>
+  </p:clrMapOvr>
+  <p:timing>
+    <p:tnLst>
+      <p:par>
+        <p:cTn id="1" dur="indefinite" restart="never" nodeType="tmRoot"/>
+      </p:par>
+    </p:tnLst>
+  </p:timing>
+</p:sld>
+</file>
+
+<file path=ppt/slides/slide6.xml><?xml version="1.0" encoding="utf-8"?>
+<p:sld xmlns:a="http://schemas.openxmlformats.org/drawingml/2006/main" xmlns:r="http://schemas.openxmlformats.org/officeDocument/2006/relationships" xmlns:mc="http://schemas.openxmlformats.org/markup-compatibility/2006" xmlns:mv="urn:schemas-microsoft-com:mac:vml" xmlns:p="http://schemas.openxmlformats.org/presentationml/2006/main" mc:Ignorable="mv" mc:PreserveAttributes="mv:*">
+  <p:cSld>
+    <p:spTree>
+      <p:nvGrpSpPr>
+        <p:cNvPr id="1" name=""/>
+        <p:cNvGrpSpPr/>
+        <p:nvPr/>
+      </p:nvGrpSpPr>
+      <p:grpSpPr>
+        <a:xfrm>
+          <a:off x="0" y="0"/>
+          <a:ext cx="0" cy="0"/>
+          <a:chOff x="0" y="0"/>
+          <a:chExt cx="0" cy="0"/>
+        </a:xfrm>
+      </p:grpSpPr>
+      <p:sp>
+        <p:nvSpPr>
+          <p:cNvPr id="2" name="Text Placeholder 1"/>
+          <p:cNvSpPr>
+            <a:spLocks noGrp="1"/>
+          </p:cNvSpPr>
+          <p:nvPr>
+            <p:ph type="body" sz="quarter" idx="13"/>
+          </p:nvPr>
+        </p:nvSpPr>
+        <p:spPr/>
+        <p:txBody>
+          <a:bodyPr/>
+          <a:lstStyle/>
+          <a:p>
+            <a:r>
+              <a:rPr lang="en-US" dirty="0" smtClean="0"/>
+              <a:t>Run </a:t>
+            </a:r>
+            <a:r>
+              <a:rPr lang="en-US" dirty="0" smtClean="0"/>
+              <a:t>Spearman Correlation Tests</a:t>
+            </a:r>
+            <a:endParaRPr lang="en-US" dirty="0" smtClean="0"/>
+          </a:p>
+          <a:p>
+            <a:pPr lvl="1"/>
+            <a:r>
+              <a:rPr lang="en-US" dirty="0" err="1" smtClean="0"/>
+              <a:t>asd</a:t>
+            </a:r>
+            <a:endParaRPr lang="en-US" dirty="0" smtClean="0"/>
+          </a:p>
+        </p:txBody>
+      </p:sp>
+      <p:sp>
+        <p:nvSpPr>
+          <p:cNvPr id="5" name="Content Placeholder 4"/>
+          <p:cNvSpPr>
+            <a:spLocks noGrp="1"/>
+          </p:cNvSpPr>
+          <p:nvPr>
+            <p:ph idx="1"/>
+          </p:nvPr>
+        </p:nvSpPr>
+        <p:spPr/>
+        <p:txBody>
+          <a:bodyPr>
+            <a:noAutofit/>
+          </a:bodyPr>
+          <a:lstStyle/>
+          <a:p>
+            <a:pPr lvl="1">
+              <a:spcAft>
+                <a:spcPts val="1800"/>
+              </a:spcAft>
+            </a:pPr>
+            <a:r>
+              <a:rPr lang="en-US" sz="2800" dirty="0" err="1" smtClean="0"/>
+              <a:t>asd</a:t>
+            </a:r>
+            <a:endParaRPr lang="en-US" sz="2800" dirty="0" smtClean="0"/>
+          </a:p>
+        </p:txBody>
+      </p:sp>
+      <p:sp>
+        <p:nvSpPr>
+          <p:cNvPr id="4" name="Slide Number Placeholder 3"/>
+          <p:cNvSpPr>
+            <a:spLocks noGrp="1"/>
+          </p:cNvSpPr>
+          <p:nvPr>
+            <p:ph type="sldNum" sz="quarter" idx="12"/>
+          </p:nvPr>
+        </p:nvSpPr>
+        <p:spPr/>
+        <p:txBody>
+          <a:bodyPr/>
+          <a:lstStyle/>
+          <a:p>
+            <a:fld id="{B9B2A88A-9ECB-DF45-A377-2575079D0564}" type="slidenum">
+              <a:rPr lang="en-GB" smtClean="0"/>
+              <a:pPr/>
+              <a:t>6</a:t>
+            </a:fld>
+            <a:endParaRPr lang="en-GB"/>
+          </a:p>
+        </p:txBody>
+      </p:sp>
+    </p:spTree>
+  </p:cSld>
+  <p:clrMapOvr>
+    <a:masterClrMapping/>
+  </p:clrMapOvr>
+  <p:timing>
+    <p:tnLst>
+      <p:par>
+        <p:cTn id="1" dur="indefinite" restart="never" nodeType="tmRoot"/>
+      </p:par>
+    </p:tnLst>
+  </p:timing>
+</p:sld>
+</file>
+
+<file path=ppt/slides/slide7.xml><?xml version="1.0" encoding="utf-8"?>
+<p:sld xmlns:a="http://schemas.openxmlformats.org/drawingml/2006/main" xmlns:r="http://schemas.openxmlformats.org/officeDocument/2006/relationships" xmlns:mc="http://schemas.openxmlformats.org/markup-compatibility/2006" xmlns:mv="urn:schemas-microsoft-com:mac:vml" xmlns:p="http://schemas.openxmlformats.org/presentationml/2006/main" mc:Ignorable="mv" mc:PreserveAttributes="mv:*">
+  <p:cSld>
+    <p:spTree>
+      <p:nvGrpSpPr>
+        <p:cNvPr id="1" name=""/>
+        <p:cNvGrpSpPr/>
+        <p:nvPr/>
+      </p:nvGrpSpPr>
+      <p:grpSpPr>
+        <a:xfrm>
+          <a:off x="0" y="0"/>
+          <a:ext cx="0" cy="0"/>
+          <a:chOff x="0" y="0"/>
+          <a:chExt cx="0" cy="0"/>
+        </a:xfrm>
+      </p:grpSpPr>
+      <p:sp>
+        <p:nvSpPr>
+          <p:cNvPr id="2" name="Text Placeholder 1"/>
+          <p:cNvSpPr>
+            <a:spLocks noGrp="1"/>
+          </p:cNvSpPr>
+          <p:nvPr>
+            <p:ph type="body" sz="quarter" idx="13"/>
+          </p:nvPr>
+        </p:nvSpPr>
+        <p:spPr/>
+        <p:txBody>
+          <a:bodyPr/>
+          <a:lstStyle/>
+          <a:p>
+            <a:r>
+              <a:rPr lang="en-US" dirty="0" err="1" smtClean="0"/>
+              <a:t>Visualise</a:t>
+            </a:r>
+            <a:r>
+              <a:rPr lang="en-US" dirty="0" smtClean="0"/>
+              <a:t> a subset of statistically significant gene-drug associations</a:t>
+            </a:r>
+          </a:p>
+          <a:p>
+            <a:pPr lvl="1"/>
+            <a:r>
+              <a:rPr lang="en-US" dirty="0" err="1" smtClean="0"/>
+              <a:t>Boxplot</a:t>
+            </a:r>
+            <a:r>
+              <a:rPr lang="en-US" dirty="0" smtClean="0"/>
+              <a:t> by mutation status</a:t>
+            </a:r>
+            <a:endParaRPr lang="en-US" dirty="0" smtClean="0"/>
+          </a:p>
+        </p:txBody>
+      </p:sp>
+      <p:sp>
+        <p:nvSpPr>
+          <p:cNvPr id="5" name="Content Placeholder 4"/>
+          <p:cNvSpPr>
+            <a:spLocks noGrp="1"/>
+          </p:cNvSpPr>
+          <p:nvPr>
+            <p:ph idx="1"/>
+          </p:nvPr>
+        </p:nvSpPr>
+        <p:spPr/>
+        <p:txBody>
+          <a:bodyPr>
+            <a:noAutofit/>
+          </a:bodyPr>
+          <a:lstStyle/>
+          <a:p>
+            <a:pPr lvl="1">
+              <a:spcAft>
+                <a:spcPts val="1800"/>
+              </a:spcAft>
+            </a:pPr>
+            <a:r>
+              <a:rPr lang="en-US" sz="2800" i="1" dirty="0" smtClean="0"/>
+              <a:t>BRAF</a:t>
+            </a:r>
+            <a:r>
+              <a:rPr lang="en-US" sz="2800" dirty="0" smtClean="0"/>
+              <a:t> mutation correlates with sensitivity to multiple RAF and MEK inhibitors</a:t>
+            </a:r>
+            <a:endParaRPr lang="en-US" sz="2800" dirty="0" smtClean="0"/>
+          </a:p>
+        </p:txBody>
+      </p:sp>
+      <p:sp>
+        <p:nvSpPr>
+          <p:cNvPr id="4" name="Slide Number Placeholder 3"/>
+          <p:cNvSpPr>
+            <a:spLocks noGrp="1"/>
+          </p:cNvSpPr>
+          <p:nvPr>
+            <p:ph type="sldNum" sz="quarter" idx="12"/>
+          </p:nvPr>
+        </p:nvSpPr>
+        <p:spPr/>
+        <p:txBody>
+          <a:bodyPr/>
+          <a:lstStyle/>
+          <a:p>
+            <a:fld id="{B9B2A88A-9ECB-DF45-A377-2575079D0564}" type="slidenum">
+              <a:rPr lang="en-GB" smtClean="0"/>
+              <a:pPr/>
+              <a:t>7</a:t>
+            </a:fld>
+            <a:endParaRPr lang="en-GB"/>
+          </a:p>
+        </p:txBody>
+      </p:sp>
+      <p:pic>
+        <p:nvPicPr>
+          <p:cNvPr id="36866" name="Picture 2"/>
+          <p:cNvPicPr>
+            <a:picLocks noChangeAspect="1" noChangeArrowheads="1"/>
+          </p:cNvPicPr>
+          <p:nvPr/>
+        </p:nvPicPr>
+        <mc:AlternateContent>
+          <mc:Choice xmlns:ma="http://schemas.microsoft.com/office/mac/drawingml/2008/main" Requires="ma">
+            <p:blipFill>
+              <a:blip r:embed="rId2"/>
+              <a:srcRect/>
+              <a:stretch>
+                <a:fillRect/>
+              </a:stretch>
+            </p:blipFill>
+          </mc:Choice>
+          <mc:Fallback>
+            <p:blipFill>
+              <a:blip r:embed="rId3"/>
+              <a:srcRect/>
+              <a:stretch>
+                <a:fillRect/>
+              </a:stretch>
+            </p:blipFill>
+          </mc:Fallback>
+        </mc:AlternateContent>
+        <p:spPr bwMode="auto">
+          <a:xfrm>
+            <a:off x="6045512" y="3470839"/>
+            <a:ext cx="1473838" cy="2063374"/>
+          </a:xfrm>
+          <a:prstGeom prst="rect">
+            <a:avLst/>
+          </a:prstGeom>
+          <a:noFill/>
+          <a:ln w="9525">
+            <a:noFill/>
+            <a:miter lim="800000"/>
+            <a:headEnd/>
+            <a:tailEnd/>
+          </a:ln>
+          <a:effectLst/>
+        </p:spPr>
+      </p:pic>
+      <p:pic>
+        <p:nvPicPr>
+          <p:cNvPr id="36867" name="Picture 3"/>
+          <p:cNvPicPr>
+            <a:picLocks noChangeAspect="1" noChangeArrowheads="1"/>
+          </p:cNvPicPr>
+          <p:nvPr/>
+        </p:nvPicPr>
+        <mc:AlternateContent>
+          <mc:Choice xmlns:ma="http://schemas.microsoft.com/office/mac/drawingml/2008/main" Requires="ma">
+            <p:blipFill>
+              <a:blip r:embed="rId4"/>
+              <a:srcRect/>
+              <a:stretch>
+                <a:fillRect/>
+              </a:stretch>
+            </p:blipFill>
+          </mc:Choice>
+          <mc:Fallback>
+            <p:blipFill>
+              <a:blip r:embed="rId5"/>
+              <a:srcRect/>
+              <a:stretch>
+                <a:fillRect/>
+              </a:stretch>
+            </p:blipFill>
+          </mc:Fallback>
+        </mc:AlternateContent>
+        <p:spPr bwMode="auto">
+          <a:xfrm>
+            <a:off x="7519350" y="3470839"/>
+            <a:ext cx="1473838" cy="2063374"/>
+          </a:xfrm>
+          <a:prstGeom prst="rect">
+            <a:avLst/>
+          </a:prstGeom>
+          <a:noFill/>
+          <a:ln w="9525">
+            <a:noFill/>
+            <a:miter lim="800000"/>
+            <a:headEnd/>
+            <a:tailEnd/>
+          </a:ln>
+          <a:effectLst/>
+        </p:spPr>
+      </p:pic>
+      <p:pic>
+        <p:nvPicPr>
+          <p:cNvPr id="36868" name="Picture 4"/>
+          <p:cNvPicPr>
+            <a:picLocks noChangeAspect="1" noChangeArrowheads="1"/>
+          </p:cNvPicPr>
+          <p:nvPr/>
+        </p:nvPicPr>
+        <mc:AlternateContent>
+          <mc:Choice xmlns:ma="http://schemas.microsoft.com/office/mac/drawingml/2008/main" Requires="ma">
+            <p:blipFill>
+              <a:blip r:embed="rId6"/>
+              <a:srcRect/>
+              <a:stretch>
+                <a:fillRect/>
+              </a:stretch>
+            </p:blipFill>
+          </mc:Choice>
+          <mc:Fallback>
+            <p:blipFill>
+              <a:blip r:embed="rId7"/>
+              <a:srcRect/>
+              <a:stretch>
+                <a:fillRect/>
+              </a:stretch>
+            </p:blipFill>
+          </mc:Fallback>
+        </mc:AlternateContent>
+        <p:spPr bwMode="auto">
+          <a:xfrm>
+            <a:off x="1637107" y="3470839"/>
+            <a:ext cx="1473838" cy="2063374"/>
+          </a:xfrm>
+          <a:prstGeom prst="rect">
+            <a:avLst/>
+          </a:prstGeom>
+          <a:noFill/>
+          <a:ln w="9525">
+            <a:noFill/>
+            <a:miter lim="800000"/>
+            <a:headEnd/>
+            <a:tailEnd/>
+          </a:ln>
+          <a:effectLst/>
+        </p:spPr>
+      </p:pic>
+      <p:pic>
+        <p:nvPicPr>
+          <p:cNvPr id="36869" name="Picture 5"/>
+          <p:cNvPicPr>
+            <a:picLocks noChangeAspect="1" noChangeArrowheads="1"/>
+          </p:cNvPicPr>
+          <p:nvPr/>
+        </p:nvPicPr>
+        <mc:AlternateContent>
+          <mc:Choice xmlns:ma="http://schemas.microsoft.com/office/mac/drawingml/2008/main" Requires="ma">
+            <p:blipFill>
+              <a:blip r:embed="rId8"/>
+              <a:srcRect/>
+              <a:stretch>
+                <a:fillRect/>
+              </a:stretch>
+            </p:blipFill>
+          </mc:Choice>
+          <mc:Fallback>
+            <p:blipFill>
+              <a:blip r:embed="rId9"/>
+              <a:srcRect/>
+              <a:stretch>
+                <a:fillRect/>
+              </a:stretch>
+            </p:blipFill>
+          </mc:Fallback>
+        </mc:AlternateContent>
+        <p:spPr bwMode="auto">
+          <a:xfrm>
+            <a:off x="4571674" y="3470839"/>
+            <a:ext cx="1473838" cy="2063374"/>
+          </a:xfrm>
+          <a:prstGeom prst="rect">
+            <a:avLst/>
+          </a:prstGeom>
+          <a:noFill/>
+          <a:ln w="9525">
+            <a:noFill/>
+            <a:miter lim="800000"/>
+            <a:headEnd/>
+            <a:tailEnd/>
+          </a:ln>
+          <a:effectLst/>
+        </p:spPr>
+      </p:pic>
+      <p:pic>
+        <p:nvPicPr>
+          <p:cNvPr id="36870" name="Picture 6"/>
+          <p:cNvPicPr>
+            <a:picLocks noChangeAspect="1" noChangeArrowheads="1"/>
+          </p:cNvPicPr>
+          <p:nvPr/>
+        </p:nvPicPr>
+        <mc:AlternateContent>
+          <mc:Choice xmlns:ma="http://schemas.microsoft.com/office/mac/drawingml/2008/main" Requires="ma">
+            <p:blipFill>
+              <a:blip r:embed="rId10"/>
+              <a:srcRect/>
+              <a:stretch>
+                <a:fillRect/>
+              </a:stretch>
+            </p:blipFill>
+          </mc:Choice>
+          <mc:Fallback>
+            <p:blipFill>
+              <a:blip r:embed="rId11"/>
+              <a:srcRect/>
+              <a:stretch>
+                <a:fillRect/>
+              </a:stretch>
+            </p:blipFill>
+          </mc:Fallback>
+        </mc:AlternateContent>
+        <p:spPr bwMode="auto">
+          <a:xfrm>
+            <a:off x="163269" y="3470839"/>
+            <a:ext cx="1473838" cy="2063374"/>
+          </a:xfrm>
+          <a:prstGeom prst="rect">
+            <a:avLst/>
+          </a:prstGeom>
+          <a:noFill/>
+          <a:ln w="9525">
+            <a:noFill/>
+            <a:miter lim="800000"/>
+            <a:headEnd/>
+            <a:tailEnd/>
+          </a:ln>
+          <a:effectLst/>
+        </p:spPr>
+      </p:pic>
+      <p:pic>
+        <p:nvPicPr>
+          <p:cNvPr id="36871" name="Picture 7"/>
+          <p:cNvPicPr>
+            <a:picLocks noChangeAspect="1" noChangeArrowheads="1"/>
+          </p:cNvPicPr>
+          <p:nvPr/>
+        </p:nvPicPr>
+        <mc:AlternateContent>
+          <mc:Choice xmlns:ma="http://schemas.microsoft.com/office/mac/drawingml/2008/main" Requires="ma">
+            <p:blipFill>
+              <a:blip r:embed="rId12"/>
+              <a:srcRect/>
+              <a:stretch>
+                <a:fillRect/>
+              </a:stretch>
+            </p:blipFill>
+          </mc:Choice>
+          <mc:Fallback>
+            <p:blipFill>
+              <a:blip r:embed="rId13"/>
+              <a:srcRect/>
+              <a:stretch>
+                <a:fillRect/>
+              </a:stretch>
+            </p:blipFill>
+          </mc:Fallback>
+        </mc:AlternateContent>
+        <p:spPr bwMode="auto">
+          <a:xfrm>
+            <a:off x="3097836" y="3470839"/>
+            <a:ext cx="1473838" cy="2063374"/>
+          </a:xfrm>
+          <a:prstGeom prst="rect">
+            <a:avLst/>
+          </a:prstGeom>
+          <a:noFill/>
+          <a:ln w="9525">
+            <a:noFill/>
+            <a:miter lim="800000"/>
+            <a:headEnd/>
+            <a:tailEnd/>
+          </a:ln>
+          <a:effectLst/>
+        </p:spPr>
+      </p:pic>
+    </p:spTree>
+  </p:cSld>
+  <p:clrMapOvr>
+    <a:masterClrMapping/>
+  </p:clrMapOvr>
+  <p:timing>
+    <p:tnLst>
+      <p:par>
+        <p:cTn id="1" dur="indefinite" restart="never" nodeType="tmRoot"/>
+      </p:par>
+    </p:tnLst>
+  </p:timing>
+</p:sld>
+</file>
+
+<file path=ppt/slides/slide8.xml><?xml version="1.0" encoding="utf-8"?>
+<p:sld xmlns:a="http://schemas.openxmlformats.org/drawingml/2006/main" xmlns:r="http://schemas.openxmlformats.org/officeDocument/2006/relationships" xmlns:mc="http://schemas.openxmlformats.org/markup-compatibility/2006" xmlns:mv="urn:schemas-microsoft-com:mac:vml" xmlns:p="http://schemas.openxmlformats.org/presentationml/2006/main" mc:Ignorable="mv" mc:PreserveAttributes="mv:*">
+  <p:cSld>
+    <p:spTree>
+      <p:nvGrpSpPr>
+        <p:cNvPr id="1" name=""/>
+        <p:cNvGrpSpPr/>
+        <p:nvPr/>
+      </p:nvGrpSpPr>
+      <p:grpSpPr>
+        <a:xfrm>
+          <a:off x="0" y="0"/>
+          <a:ext cx="0" cy="0"/>
+          <a:chOff x="0" y="0"/>
+          <a:chExt cx="0" cy="0"/>
+        </a:xfrm>
+      </p:grpSpPr>
+      <p:sp>
+        <p:nvSpPr>
+          <p:cNvPr id="2" name="Text Placeholder 1"/>
+          <p:cNvSpPr>
+            <a:spLocks noGrp="1"/>
+          </p:cNvSpPr>
+          <p:nvPr>
+            <p:ph type="body" sz="quarter" idx="13"/>
+          </p:nvPr>
+        </p:nvSpPr>
+        <p:spPr/>
+        <p:txBody>
+          <a:bodyPr/>
+          <a:lstStyle/>
+          <a:p>
+            <a:r>
+              <a:rPr lang="en-US" dirty="0" err="1" smtClean="0"/>
+              <a:t>Visualise</a:t>
+            </a:r>
+            <a:r>
+              <a:rPr lang="en-US" dirty="0" smtClean="0"/>
+              <a:t> a subset of statistically significant gene-drug associations</a:t>
+            </a:r>
+          </a:p>
+          <a:p>
+            <a:pPr lvl="1"/>
+            <a:r>
+              <a:rPr lang="en-US" dirty="0" err="1" smtClean="0"/>
+              <a:t>Boxplot</a:t>
+            </a:r>
+            <a:r>
+              <a:rPr lang="en-US" dirty="0" smtClean="0"/>
+              <a:t> by copy </a:t>
+            </a:r>
+            <a:r>
+              <a:rPr lang="en-US" dirty="0" smtClean="0"/>
+              <a:t>number</a:t>
+            </a:r>
+            <a:endParaRPr lang="en-US" dirty="0" smtClean="0"/>
+          </a:p>
+        </p:txBody>
+      </p:sp>
+      <p:sp>
+        <p:nvSpPr>
+          <p:cNvPr id="5" name="Content Placeholder 4"/>
+          <p:cNvSpPr>
+            <a:spLocks noGrp="1"/>
+          </p:cNvSpPr>
+          <p:nvPr>
+            <p:ph idx="1"/>
+          </p:nvPr>
+        </p:nvSpPr>
+        <p:spPr/>
+        <p:txBody>
+          <a:bodyPr>
+            <a:noAutofit/>
+          </a:bodyPr>
+          <a:lstStyle/>
+          <a:p>
+            <a:pPr lvl="1">
+              <a:spcAft>
+                <a:spcPts val="1800"/>
+              </a:spcAft>
+            </a:pPr>
+            <a:r>
+              <a:rPr lang="en-US" sz="2800" i="1" dirty="0" smtClean="0"/>
+              <a:t>EGFR</a:t>
+            </a:r>
+            <a:r>
+              <a:rPr lang="en-US" sz="2800" dirty="0" smtClean="0"/>
+              <a:t> amplification correlates with sensitivity to </a:t>
+            </a:r>
+            <a:r>
+              <a:rPr lang="en-US" sz="2800" dirty="0" err="1" smtClean="0"/>
+              <a:t>lapatinib</a:t>
+            </a:r>
+            <a:r>
+              <a:rPr lang="en-US" sz="2800" dirty="0" smtClean="0"/>
+              <a:t> (</a:t>
+            </a:r>
+            <a:r>
+              <a:rPr lang="en-US" sz="2800" dirty="0" err="1" smtClean="0"/>
+              <a:t>r</a:t>
+            </a:r>
+            <a:r>
+              <a:rPr lang="en-US" sz="2800" dirty="0" smtClean="0"/>
+              <a:t>=-0.2, </a:t>
+            </a:r>
+            <a:r>
+              <a:rPr lang="en-US" sz="2800" dirty="0" err="1" smtClean="0"/>
+              <a:t>p</a:t>
+            </a:r>
+            <a:r>
+              <a:rPr lang="en-US" sz="2800" dirty="0" smtClean="0"/>
+              <a:t>=4e-04)</a:t>
+            </a:r>
+            <a:endParaRPr lang="en-US" sz="2800" dirty="0" smtClean="0"/>
+          </a:p>
+        </p:txBody>
+      </p:sp>
+      <p:sp>
+        <p:nvSpPr>
+          <p:cNvPr id="4" name="Slide Number Placeholder 3"/>
+          <p:cNvSpPr>
+            <a:spLocks noGrp="1"/>
+          </p:cNvSpPr>
+          <p:nvPr>
+            <p:ph type="sldNum" sz="quarter" idx="12"/>
+          </p:nvPr>
+        </p:nvSpPr>
+        <p:spPr/>
+        <p:txBody>
+          <a:bodyPr/>
+          <a:lstStyle/>
+          <a:p>
+            <a:fld id="{B9B2A88A-9ECB-DF45-A377-2575079D0564}" type="slidenum">
+              <a:rPr lang="en-GB" smtClean="0"/>
+              <a:pPr/>
+              <a:t>8</a:t>
+            </a:fld>
+            <a:endParaRPr lang="en-GB"/>
+          </a:p>
+        </p:txBody>
+      </p:sp>
+      <p:pic>
+        <p:nvPicPr>
+          <p:cNvPr id="43010" name="Picture 2"/>
+          <p:cNvPicPr>
+            <a:picLocks noChangeAspect="1" noChangeArrowheads="1"/>
+          </p:cNvPicPr>
+          <p:nvPr/>
+        </p:nvPicPr>
+        <mc:AlternateContent>
+          <mc:Choice xmlns:ma="http://schemas.microsoft.com/office/mac/drawingml/2008/main" Requires="ma">
+            <p:blipFill>
+              <a:blip r:embed="rId2"/>
+              <a:srcRect/>
+              <a:stretch>
+                <a:fillRect/>
+              </a:stretch>
+            </p:blipFill>
+          </mc:Choice>
+          <mc:Fallback>
+            <p:blipFill>
+              <a:blip r:embed="rId3"/>
+              <a:srcRect/>
+              <a:stretch>
+                <a:fillRect/>
+              </a:stretch>
+            </p:blipFill>
+          </mc:Fallback>
+        </mc:AlternateContent>
+        <p:spPr bwMode="auto">
+          <a:xfrm>
+            <a:off x="163269" y="3326036"/>
+            <a:ext cx="7442468" cy="2604864"/>
+          </a:xfrm>
+          <a:prstGeom prst="rect">
+            <a:avLst/>
+          </a:prstGeom>
+          <a:noFill/>
+          <a:ln w="9525">
+            <a:noFill/>
+            <a:miter lim="800000"/>
+            <a:headEnd/>
+            <a:tailEnd/>
+          </a:ln>
+          <a:effectLst/>
+        </p:spPr>
+      </p:pic>
+    </p:spTree>
+  </p:cSld>
+  <p:clrMapOvr>
+    <a:masterClrMapping/>
+  </p:clrMapOvr>
+  <p:timing>
+    <p:tnLst>
+      <p:par>
+        <p:cTn id="1" dur="indefinite" restart="never" nodeType="tmRoot"/>
+      </p:par>
+    </p:tnLst>
+  </p:timing>
+</p:sld>
+</file>
+
+<file path=ppt/slides/slide9.xml><?xml version="1.0" encoding="utf-8"?>
+<p:sld xmlns:a="http://schemas.openxmlformats.org/drawingml/2006/main" xmlns:r="http://schemas.openxmlformats.org/officeDocument/2006/relationships" xmlns:mc="http://schemas.openxmlformats.org/markup-compatibility/2006" xmlns:mv="urn:schemas-microsoft-com:mac:vml" xmlns:p="http://schemas.openxmlformats.org/presentationml/2006/main" mc:Ignorable="mv" mc:PreserveAttributes="mv:*">
+  <p:cSld>
+    <p:spTree>
+      <p:nvGrpSpPr>
+        <p:cNvPr id="1" name=""/>
+        <p:cNvGrpSpPr/>
+        <p:nvPr/>
+      </p:nvGrpSpPr>
+      <p:grpSpPr>
+        <a:xfrm>
+          <a:off x="0" y="0"/>
+          <a:ext cx="0" cy="0"/>
+          <a:chOff x="0" y="0"/>
+          <a:chExt cx="0" cy="0"/>
+        </a:xfrm>
+      </p:grpSpPr>
+      <p:sp>
+        <p:nvSpPr>
+          <p:cNvPr id="2" name="Text Placeholder 1"/>
+          <p:cNvSpPr>
+            <a:spLocks noGrp="1"/>
+          </p:cNvSpPr>
+          <p:nvPr>
+            <p:ph type="body" sz="quarter" idx="13"/>
+          </p:nvPr>
+        </p:nvSpPr>
+        <p:spPr/>
+        <p:txBody>
+          <a:bodyPr/>
+          <a:lstStyle/>
+          <a:p>
+            <a:r>
+              <a:rPr lang="en-US" dirty="0" err="1" smtClean="0"/>
+              <a:t>Visualise</a:t>
+            </a:r>
+            <a:r>
+              <a:rPr lang="en-US" dirty="0" smtClean="0"/>
+              <a:t> a subset of statistically significant gene-drug associations</a:t>
+            </a:r>
+          </a:p>
+          <a:p>
+            <a:pPr lvl="1"/>
+            <a:r>
+              <a:rPr lang="en-US" dirty="0" err="1" smtClean="0"/>
+              <a:t>Boxplot</a:t>
+            </a:r>
+            <a:r>
+              <a:rPr lang="en-US" dirty="0" smtClean="0"/>
+              <a:t> by copy </a:t>
+            </a:r>
+            <a:r>
+              <a:rPr lang="en-US" dirty="0" smtClean="0"/>
+              <a:t>number</a:t>
+            </a:r>
+            <a:endParaRPr lang="en-US" dirty="0" smtClean="0"/>
+          </a:p>
+        </p:txBody>
+      </p:sp>
+      <p:sp>
+        <p:nvSpPr>
+          <p:cNvPr id="5" name="Content Placeholder 4"/>
+          <p:cNvSpPr>
+            <a:spLocks noGrp="1"/>
+          </p:cNvSpPr>
+          <p:nvPr>
+            <p:ph idx="1"/>
+          </p:nvPr>
+        </p:nvSpPr>
+        <p:spPr/>
+        <p:txBody>
+          <a:bodyPr>
+            <a:noAutofit/>
+          </a:bodyPr>
+          <a:lstStyle/>
+          <a:p>
+            <a:pPr lvl="1">
+              <a:spcAft>
+                <a:spcPts val="1800"/>
+              </a:spcAft>
+            </a:pPr>
+            <a:r>
+              <a:rPr lang="en-US" sz="2800" i="1" dirty="0" smtClean="0"/>
+              <a:t>TP53</a:t>
+            </a:r>
+            <a:r>
+              <a:rPr lang="en-US" sz="2800" dirty="0" smtClean="0"/>
+              <a:t> deletion correlates with resistance to </a:t>
+            </a:r>
+            <a:r>
+              <a:rPr lang="en-US" sz="2800" dirty="0" err="1" smtClean="0"/>
+              <a:t>nutlin</a:t>
+            </a:r>
+            <a:r>
+              <a:rPr lang="en-US" sz="2800" dirty="0" smtClean="0"/>
+              <a:t> (</a:t>
+            </a:r>
+            <a:r>
+              <a:rPr lang="en-US" sz="2800" dirty="0" err="1" smtClean="0"/>
+              <a:t>r</a:t>
+            </a:r>
+            <a:r>
+              <a:rPr lang="en-US" sz="2800" dirty="0" smtClean="0"/>
+              <a:t>=0.43, </a:t>
+            </a:r>
+            <a:r>
+              <a:rPr lang="en-US" sz="2800" dirty="0" err="1" smtClean="0"/>
+              <a:t>p</a:t>
+            </a:r>
+            <a:r>
+              <a:rPr lang="en-US" sz="2800" dirty="0" smtClean="0"/>
+              <a:t>=6.5e-29)</a:t>
+            </a:r>
+            <a:endParaRPr lang="en-US" sz="2800" dirty="0" smtClean="0"/>
+          </a:p>
+        </p:txBody>
+      </p:sp>
+      <p:sp>
+        <p:nvSpPr>
+          <p:cNvPr id="4" name="Slide Number Placeholder 3"/>
+          <p:cNvSpPr>
+            <a:spLocks noGrp="1"/>
+          </p:cNvSpPr>
+          <p:nvPr>
+            <p:ph type="sldNum" sz="quarter" idx="12"/>
+          </p:nvPr>
+        </p:nvSpPr>
+        <p:spPr/>
+        <p:txBody>
+          <a:bodyPr/>
+          <a:lstStyle/>
+          <a:p>
+            <a:fld id="{B9B2A88A-9ECB-DF45-A377-2575079D0564}" type="slidenum">
+              <a:rPr lang="en-GB" smtClean="0"/>
+              <a:pPr/>
+              <a:t>9</a:t>
+            </a:fld>
+            <a:endParaRPr lang="en-GB"/>
+          </a:p>
+        </p:txBody>
+      </p:sp>
+      <p:pic>
+        <p:nvPicPr>
+          <p:cNvPr id="44034" name="Picture 2"/>
+          <p:cNvPicPr>
+            <a:picLocks noChangeAspect="1" noChangeArrowheads="1"/>
+          </p:cNvPicPr>
+          <p:nvPr/>
+        </p:nvPicPr>
+        <mc:AlternateContent>
+          <mc:Choice xmlns:ma="http://schemas.microsoft.com/office/mac/drawingml/2008/main" Requires="ma">
+            <p:blipFill>
+              <a:blip r:embed="rId2"/>
+              <a:srcRect/>
+              <a:stretch>
+                <a:fillRect/>
+              </a:stretch>
+            </p:blipFill>
+          </mc:Choice>
+          <mc:Fallback>
+            <p:blipFill>
+              <a:blip r:embed="rId3"/>
+              <a:srcRect/>
+              <a:stretch>
+                <a:fillRect/>
+              </a:stretch>
+            </p:blipFill>
+          </mc:Fallback>
+        </mc:AlternateContent>
+        <p:spPr bwMode="auto">
+          <a:xfrm>
+            <a:off x="163270" y="3323510"/>
+            <a:ext cx="7861544" cy="2751541"/>
+          </a:xfrm>
+          <a:prstGeom prst="rect">
+            <a:avLst/>
+          </a:prstGeom>
+          <a:noFill/>
+          <a:ln w="9525">
+            <a:noFill/>
+            <a:miter lim="800000"/>
+            <a:headEnd/>
+            <a:tailEnd/>
+          </a:ln>
+          <a:effectLst/>
         </p:spPr>
       </p:pic>
     </p:spTree>

</xml_diff>